<commit_message>
M2 Complete: Enhanced markdown processing and list formatting
- Upgraded from markdown library to markdown-it-py for modern processing
- Fixed list rendering with proper line breaks and formatting
- Added comprehensive theme system with CSS styling
- Fixed PPTX content rendering issues (text box margins, sizing)
- Expanded test suite from 18 to 41 tests with comprehensive validation
- Created dedicated gslides_test conda environment
- Updated PROJECT_STRUCTURE.md with M2 status and documentation

Key improvements:
- Lists now process ul/ol elements directly with proper \n line breaks
- All content renders correctly in PPTX without truncation
- Modern markdown parser supports tables, strikethrough, linkify
- Enhanced test coverage validates all functionality
- Ready for M3 advanced features (inline styling, rich text)
</commit_message>
<xml_diff>
--- a/output/demo.pptx
+++ b/output/demo.pptx
@@ -3098,8 +3098,8 @@
         </p:nvSpPr>
         <p:spPr>
           <a:xfrm>
-            <a:off x="507873" y="812800"/>
-            <a:ext cx="11173206" cy="520700"/>
+            <a:off x="507873" y="508000"/>
+            <a:ext cx="11173206" cy="533399"/>
           </a:xfrm>
           <a:prstGeom prst="rect">
             <a:avLst/>
@@ -3107,7 +3107,7 @@
           <a:noFill/>
         </p:spPr>
         <p:txBody>
-          <a:bodyPr wrap="square">
+          <a:bodyPr wrap="square" lIns="0" rIns="0" tIns="0" bIns="0">
             <a:spAutoFit/>
           </a:bodyPr>
           <a:lstStyle/>
@@ -3133,7 +3133,7 @@
         </p:nvSpPr>
         <p:spPr>
           <a:xfrm>
-            <a:off x="507873" y="1587499"/>
+            <a:off x="507873" y="1295399"/>
             <a:ext cx="11173206" cy="317500"/>
           </a:xfrm>
           <a:prstGeom prst="rect">
@@ -3142,7 +3142,7 @@
           <a:noFill/>
         </p:spPr>
         <p:txBody>
-          <a:bodyPr wrap="square">
+          <a:bodyPr wrap="square" lIns="0" rIns="0" tIns="0" bIns="0">
             <a:spAutoFit/>
           </a:bodyPr>
           <a:lstStyle/>
@@ -3168,7 +3168,7 @@
         </p:nvSpPr>
         <p:spPr>
           <a:xfrm>
-            <a:off x="507873" y="2197100"/>
+            <a:off x="507873" y="1904999"/>
             <a:ext cx="11173206" cy="406400"/>
           </a:xfrm>
           <a:prstGeom prst="rect">
@@ -3177,7 +3177,7 @@
           <a:noFill/>
         </p:spPr>
         <p:txBody>
-          <a:bodyPr wrap="square">
+          <a:bodyPr wrap="square" lIns="0" rIns="0" tIns="0" bIns="0">
             <a:spAutoFit/>
           </a:bodyPr>
           <a:lstStyle/>
@@ -3203,7 +3203,7 @@
         </p:nvSpPr>
         <p:spPr>
           <a:xfrm>
-            <a:off x="761809" y="2844799"/>
+            <a:off x="761809" y="2540000"/>
             <a:ext cx="10919269" cy="1155700"/>
           </a:xfrm>
           <a:prstGeom prst="rect">
@@ -3212,12 +3212,11 @@
           <a:noFill/>
         </p:spPr>
         <p:txBody>
-          <a:bodyPr wrap="square">
+          <a:bodyPr wrap="square" lIns="0" rIns="0" tIns="0" bIns="0">
             <a:spAutoFit/>
           </a:bodyPr>
           <a:lstStyle/>
           <a:p>
-            <a:br/>
             <a:pPr algn="l">
               <a:defRPr sz="1400">
                 <a:solidFill>
@@ -3226,17 +3225,16 @@
               </a:defRPr>
             </a:pPr>
             <a:r>
-              <a:t>Converts markdown to PowerPoint</a:t>
+              <a:t>• Converts markdown to PowerPoint</a:t>
             </a:r>
             <a:br/>
             <a:r>
-              <a:t>Automatic layout and formatting</a:t>
+              <a:t>• Automatic layout and formatting</a:t>
             </a:r>
             <a:br/>
             <a:r>
-              <a:t>Multiple slide support</a:t>
-            </a:r>
-            <a:br/>
+              <a:t>• Multiple slide support</a:t>
+            </a:r>
           </a:p>
         </p:txBody>
       </p:sp>
@@ -3266,8 +3264,8 @@
         </p:nvSpPr>
         <p:spPr>
           <a:xfrm>
-            <a:off x="507873" y="7670800"/>
-            <a:ext cx="11173206" cy="520700"/>
+            <a:off x="507873" y="508000"/>
+            <a:ext cx="11173206" cy="533399"/>
           </a:xfrm>
           <a:prstGeom prst="rect">
             <a:avLst/>
@@ -3275,7 +3273,7 @@
           <a:noFill/>
         </p:spPr>
         <p:txBody>
-          <a:bodyPr wrap="square">
+          <a:bodyPr wrap="square" lIns="0" rIns="0" tIns="0" bIns="0">
             <a:spAutoFit/>
           </a:bodyPr>
           <a:lstStyle/>
@@ -3301,7 +3299,7 @@
         </p:nvSpPr>
         <p:spPr>
           <a:xfrm>
-            <a:off x="507873" y="8445500"/>
+            <a:off x="507873" y="1295399"/>
             <a:ext cx="11173206" cy="317500"/>
           </a:xfrm>
           <a:prstGeom prst="rect">
@@ -3310,7 +3308,7 @@
           <a:noFill/>
         </p:spPr>
         <p:txBody>
-          <a:bodyPr wrap="square">
+          <a:bodyPr wrap="square" lIns="0" rIns="0" tIns="0" bIns="0">
             <a:spAutoFit/>
           </a:bodyPr>
           <a:lstStyle/>
@@ -3336,7 +3334,7 @@
         </p:nvSpPr>
         <p:spPr>
           <a:xfrm>
-            <a:off x="507873" y="9055100"/>
+            <a:off x="507873" y="1904999"/>
             <a:ext cx="11173206" cy="406400"/>
           </a:xfrm>
           <a:prstGeom prst="rect">
@@ -3345,7 +3343,7 @@
           <a:noFill/>
         </p:spPr>
         <p:txBody>
-          <a:bodyPr wrap="square">
+          <a:bodyPr wrap="square" lIns="0" rIns="0" tIns="0" bIns="0">
             <a:spAutoFit/>
           </a:bodyPr>
           <a:lstStyle/>
@@ -3371,8 +3369,8 @@
         </p:nvSpPr>
         <p:spPr>
           <a:xfrm>
-            <a:off x="507873" y="9664700"/>
-            <a:ext cx="11173206" cy="838200"/>
+            <a:off x="507873" y="2501900"/>
+            <a:ext cx="11173206" cy="863600"/>
           </a:xfrm>
           <a:prstGeom prst="rect">
             <a:avLst/>
@@ -3382,7 +3380,7 @@
           </a:solidFill>
         </p:spPr>
         <p:txBody>
-          <a:bodyPr wrap="square">
+          <a:bodyPr wrap="square" lIns="0" rIns="0" tIns="0" bIns="0">
             <a:spAutoFit/>
           </a:bodyPr>
           <a:lstStyle/>
@@ -3418,7 +3416,7 @@
         </p:nvSpPr>
         <p:spPr>
           <a:xfrm>
-            <a:off x="507873" y="10795000"/>
+            <a:off x="507873" y="3657600"/>
             <a:ext cx="11173206" cy="406400"/>
           </a:xfrm>
           <a:prstGeom prst="rect">
@@ -3427,7 +3425,7 @@
           <a:noFill/>
         </p:spPr>
         <p:txBody>
-          <a:bodyPr wrap="square">
+          <a:bodyPr wrap="square" lIns="0" rIns="0" tIns="0" bIns="0">
             <a:spAutoFit/>
           </a:bodyPr>
           <a:lstStyle/>
@@ -3453,7 +3451,7 @@
         </p:nvSpPr>
         <p:spPr>
           <a:xfrm>
-            <a:off x="761809" y="11442699"/>
+            <a:off x="761809" y="4292599"/>
             <a:ext cx="10919269" cy="1155700"/>
           </a:xfrm>
           <a:prstGeom prst="rect">
@@ -3462,12 +3460,11 @@
           <a:noFill/>
         </p:spPr>
         <p:txBody>
-          <a:bodyPr wrap="square">
+          <a:bodyPr wrap="square" lIns="0" rIns="0" tIns="0" bIns="0">
             <a:spAutoFit/>
           </a:bodyPr>
           <a:lstStyle/>
           <a:p>
-            <a:br/>
             <a:pPr algn="l">
               <a:defRPr sz="1400">
                 <a:solidFill>
@@ -3476,17 +3473,16 @@
               </a:defRPr>
             </a:pPr>
             <a:r>
-              <a:t>First item</a:t>
+              <a:t>1. First item</a:t>
             </a:r>
             <a:br/>
             <a:r>
-              <a:t>Second item</a:t>
+              <a:t>2. Second item</a:t>
             </a:r>
             <a:br/>
             <a:r>
-              <a:t>Third item</a:t>
-            </a:r>
-            <a:br/>
+              <a:t>3. Third item</a:t>
+            </a:r>
           </a:p>
         </p:txBody>
       </p:sp>
@@ -3516,8 +3512,8 @@
         </p:nvSpPr>
         <p:spPr>
           <a:xfrm>
-            <a:off x="507873" y="14528799"/>
-            <a:ext cx="11173206" cy="520700"/>
+            <a:off x="507873" y="508000"/>
+            <a:ext cx="11173206" cy="533399"/>
           </a:xfrm>
           <a:prstGeom prst="rect">
             <a:avLst/>
@@ -3525,7 +3521,7 @@
           <a:noFill/>
         </p:spPr>
         <p:txBody>
-          <a:bodyPr wrap="square">
+          <a:bodyPr wrap="square" lIns="0" rIns="0" tIns="0" bIns="0">
             <a:spAutoFit/>
           </a:bodyPr>
           <a:lstStyle/>
@@ -3551,7 +3547,7 @@
         </p:nvSpPr>
         <p:spPr>
           <a:xfrm>
-            <a:off x="507873" y="15303500"/>
+            <a:off x="507873" y="1295399"/>
             <a:ext cx="11173206" cy="317500"/>
           </a:xfrm>
           <a:prstGeom prst="rect">
@@ -3560,7 +3556,7 @@
           <a:noFill/>
         </p:spPr>
         <p:txBody>
-          <a:bodyPr wrap="square">
+          <a:bodyPr wrap="square" lIns="0" rIns="0" tIns="0" bIns="0">
             <a:spAutoFit/>
           </a:bodyPr>
           <a:lstStyle/>
@@ -3586,7 +3582,42 @@
         </p:nvSpPr>
         <p:spPr>
           <a:xfrm>
-            <a:off x="507873" y="15900400"/>
+            <a:off x="507873" y="1892299"/>
+            <a:ext cx="11173206" cy="330200"/>
+          </a:xfrm>
+          <a:prstGeom prst="rect">
+            <a:avLst/>
+          </a:prstGeom>
+          <a:noFill/>
+        </p:spPr>
+        <p:txBody>
+          <a:bodyPr wrap="square" lIns="0" rIns="0" tIns="0" bIns="0">
+            <a:spAutoFit/>
+          </a:bodyPr>
+          <a:lstStyle/>
+          <a:p>
+            <a:pPr algn="l">
+              <a:defRPr sz="1800" b="1">
+                <a:solidFill>
+                  <a:srgbClr val="000000"/>
+                </a:solidFill>
+              </a:defRPr>
+            </a:pPr>
+            <a:r>
+              <a:t>Questions?</a:t>
+            </a:r>
+          </a:p>
+        </p:txBody>
+      </p:sp>
+      <p:sp>
+        <p:nvSpPr>
+          <p:cNvPr id="5" name="TextBox 4"/>
+          <p:cNvSpPr txBox="1"/>
+          <p:nvPr/>
+        </p:nvSpPr>
+        <p:spPr>
+          <a:xfrm>
+            <a:off x="507873" y="2451100"/>
             <a:ext cx="11173206" cy="317500"/>
           </a:xfrm>
           <a:prstGeom prst="rect">
@@ -3595,42 +3626,7 @@
           <a:noFill/>
         </p:spPr>
         <p:txBody>
-          <a:bodyPr wrap="square">
-            <a:spAutoFit/>
-          </a:bodyPr>
-          <a:lstStyle/>
-          <a:p>
-            <a:pPr algn="l">
-              <a:defRPr sz="1800" b="1">
-                <a:solidFill>
-                  <a:srgbClr val="000000"/>
-                </a:solidFill>
-              </a:defRPr>
-            </a:pPr>
-            <a:r>
-              <a:t>Questions?</a:t>
-            </a:r>
-          </a:p>
-        </p:txBody>
-      </p:sp>
-      <p:sp>
-        <p:nvSpPr>
-          <p:cNvPr id="5" name="TextBox 4"/>
-          <p:cNvSpPr txBox="1"/>
-          <p:nvPr/>
-        </p:nvSpPr>
-        <p:spPr>
-          <a:xfrm>
-            <a:off x="507873" y="16446500"/>
-            <a:ext cx="11173206" cy="317500"/>
-          </a:xfrm>
-          <a:prstGeom prst="rect">
-            <a:avLst/>
-          </a:prstGeom>
-          <a:noFill/>
-        </p:spPr>
-        <p:txBody>
-          <a:bodyPr wrap="square">
+          <a:bodyPr wrap="square" lIns="0" rIns="0" tIns="0" bIns="0">
             <a:spAutoFit/>
           </a:bodyPr>
           <a:lstStyle/>

</xml_diff>